<commit_message>
added changes to UI - PPT
</commit_message>
<xml_diff>
--- a/mockup.pptx
+++ b/mockup.pptx
@@ -109,6 +109,11 @@
       </a:defRPr>
     </a:lvl9pPr>
   </p:defaultTextStyle>
+  <p:extLst>
+    <p:ext uri="{EFAFB233-063F-42B5-8137-9DF3F51BA10A}">
+      <p15:sldGuideLst xmlns:p15="http://schemas.microsoft.com/office/powerpoint/2012/main"/>
+    </p:ext>
+  </p:extLst>
 </p:presentation>
 </file>
 
@@ -261,7 +266,7 @@
           <a:p>
             <a:fld id="{07E32396-AAE1-4E9C-8E83-E36CEFA6D003}" type="datetimeFigureOut">
               <a:rPr lang="en-IN" smtClean="0"/>
-              <a:t>08-04-2024</a:t>
+              <a:t>14-04-2024</a:t>
             </a:fld>
             <a:endParaRPr lang="en-IN"/>
           </a:p>
@@ -461,7 +466,7 @@
           <a:p>
             <a:fld id="{07E32396-AAE1-4E9C-8E83-E36CEFA6D003}" type="datetimeFigureOut">
               <a:rPr lang="en-IN" smtClean="0"/>
-              <a:t>08-04-2024</a:t>
+              <a:t>14-04-2024</a:t>
             </a:fld>
             <a:endParaRPr lang="en-IN"/>
           </a:p>
@@ -671,7 +676,7 @@
           <a:p>
             <a:fld id="{07E32396-AAE1-4E9C-8E83-E36CEFA6D003}" type="datetimeFigureOut">
               <a:rPr lang="en-IN" smtClean="0"/>
-              <a:t>08-04-2024</a:t>
+              <a:t>14-04-2024</a:t>
             </a:fld>
             <a:endParaRPr lang="en-IN"/>
           </a:p>
@@ -871,7 +876,7 @@
           <a:p>
             <a:fld id="{07E32396-AAE1-4E9C-8E83-E36CEFA6D003}" type="datetimeFigureOut">
               <a:rPr lang="en-IN" smtClean="0"/>
-              <a:t>08-04-2024</a:t>
+              <a:t>14-04-2024</a:t>
             </a:fld>
             <a:endParaRPr lang="en-IN"/>
           </a:p>
@@ -1147,7 +1152,7 @@
           <a:p>
             <a:fld id="{07E32396-AAE1-4E9C-8E83-E36CEFA6D003}" type="datetimeFigureOut">
               <a:rPr lang="en-IN" smtClean="0"/>
-              <a:t>08-04-2024</a:t>
+              <a:t>14-04-2024</a:t>
             </a:fld>
             <a:endParaRPr lang="en-IN"/>
           </a:p>
@@ -1415,7 +1420,7 @@
           <a:p>
             <a:fld id="{07E32396-AAE1-4E9C-8E83-E36CEFA6D003}" type="datetimeFigureOut">
               <a:rPr lang="en-IN" smtClean="0"/>
-              <a:t>08-04-2024</a:t>
+              <a:t>14-04-2024</a:t>
             </a:fld>
             <a:endParaRPr lang="en-IN"/>
           </a:p>
@@ -1830,7 +1835,7 @@
           <a:p>
             <a:fld id="{07E32396-AAE1-4E9C-8E83-E36CEFA6D003}" type="datetimeFigureOut">
               <a:rPr lang="en-IN" smtClean="0"/>
-              <a:t>08-04-2024</a:t>
+              <a:t>14-04-2024</a:t>
             </a:fld>
             <a:endParaRPr lang="en-IN"/>
           </a:p>
@@ -1972,7 +1977,7 @@
           <a:p>
             <a:fld id="{07E32396-AAE1-4E9C-8E83-E36CEFA6D003}" type="datetimeFigureOut">
               <a:rPr lang="en-IN" smtClean="0"/>
-              <a:t>08-04-2024</a:t>
+              <a:t>14-04-2024</a:t>
             </a:fld>
             <a:endParaRPr lang="en-IN"/>
           </a:p>
@@ -2085,7 +2090,7 @@
           <a:p>
             <a:fld id="{07E32396-AAE1-4E9C-8E83-E36CEFA6D003}" type="datetimeFigureOut">
               <a:rPr lang="en-IN" smtClean="0"/>
-              <a:t>08-04-2024</a:t>
+              <a:t>14-04-2024</a:t>
             </a:fld>
             <a:endParaRPr lang="en-IN"/>
           </a:p>
@@ -2398,7 +2403,7 @@
           <a:p>
             <a:fld id="{07E32396-AAE1-4E9C-8E83-E36CEFA6D003}" type="datetimeFigureOut">
               <a:rPr lang="en-IN" smtClean="0"/>
-              <a:t>08-04-2024</a:t>
+              <a:t>14-04-2024</a:t>
             </a:fld>
             <a:endParaRPr lang="en-IN"/>
           </a:p>
@@ -2687,7 +2692,7 @@
           <a:p>
             <a:fld id="{07E32396-AAE1-4E9C-8E83-E36CEFA6D003}" type="datetimeFigureOut">
               <a:rPr lang="en-IN" smtClean="0"/>
-              <a:t>08-04-2024</a:t>
+              <a:t>14-04-2024</a:t>
             </a:fld>
             <a:endParaRPr lang="en-IN"/>
           </a:p>
@@ -2930,7 +2935,7 @@
           <a:p>
             <a:fld id="{07E32396-AAE1-4E9C-8E83-E36CEFA6D003}" type="datetimeFigureOut">
               <a:rPr lang="en-IN" smtClean="0"/>
-              <a:t>08-04-2024</a:t>
+              <a:t>14-04-2024</a:t>
             </a:fld>
             <a:endParaRPr lang="en-IN"/>
           </a:p>
@@ -4693,8 +4698,8 @@
         </p:nvSpPr>
         <p:spPr>
           <a:xfrm>
-            <a:off x="914400" y="1632155"/>
-            <a:ext cx="2054942" cy="3313471"/>
+            <a:off x="936523" y="1332696"/>
+            <a:ext cx="2040194" cy="1892286"/>
           </a:xfrm>
           <a:prstGeom prst="rect">
             <a:avLst/>
@@ -4745,7 +4750,7 @@
         </p:nvSpPr>
         <p:spPr>
           <a:xfrm>
-            <a:off x="1032387" y="1838632"/>
+            <a:off x="1069258" y="1479980"/>
             <a:ext cx="1809136" cy="369332"/>
           </a:xfrm>
           <a:prstGeom prst="rect">
@@ -4780,8 +4785,8 @@
         </p:nvSpPr>
         <p:spPr>
           <a:xfrm>
-            <a:off x="1032387" y="2452526"/>
-            <a:ext cx="1809136" cy="1754326"/>
+            <a:off x="1112274" y="1872282"/>
+            <a:ext cx="1798075" cy="830997"/>
           </a:xfrm>
           <a:prstGeom prst="rect">
             <a:avLst/>
@@ -4795,16 +4800,16 @@
           <a:lstStyle/>
           <a:p>
             <a:r>
-              <a:rPr lang="en-IN" dirty="0"/>
+              <a:rPr lang="en-IN" sz="1200" dirty="0"/>
               <a:t>Event 1: Blood Drive </a:t>
             </a:r>
           </a:p>
           <a:p>
-            <a:endParaRPr lang="en-IN" dirty="0"/>
-          </a:p>
-          <a:p>
-            <a:r>
-              <a:rPr lang="en-IN" dirty="0"/>
+            <a:endParaRPr lang="en-IN" sz="1200" dirty="0"/>
+          </a:p>
+          <a:p>
+            <a:r>
+              <a:rPr lang="en-IN" sz="1200" dirty="0"/>
               <a:t>Event 2: Blood Donation Awareness</a:t>
             </a:r>
           </a:p>
@@ -5291,6 +5296,140 @@
           <a:p>
             <a:pPr algn="ctr"/>
             <a:endParaRPr lang="en-IN"/>
+          </a:p>
+        </p:txBody>
+      </p:sp>
+      <p:sp>
+        <p:nvSpPr>
+          <p:cNvPr id="2" name="Rectangle 1">
+            <a:extLst>
+              <a:ext uri="{FF2B5EF4-FFF2-40B4-BE49-F238E27FC236}">
+                <a16:creationId xmlns:a16="http://schemas.microsoft.com/office/drawing/2014/main" id="{8D1DFD3D-8717-8095-2534-21A63F6AC1EA}"/>
+              </a:ext>
+            </a:extLst>
+          </p:cNvPr>
+          <p:cNvSpPr/>
+          <p:nvPr/>
+        </p:nvSpPr>
+        <p:spPr>
+          <a:xfrm>
+            <a:off x="919316" y="3519948"/>
+            <a:ext cx="2040194" cy="1858072"/>
+          </a:xfrm>
+          <a:prstGeom prst="rect">
+            <a:avLst/>
+          </a:prstGeom>
+          <a:solidFill>
+            <a:schemeClr val="accent1">
+              <a:lumMod val="20000"/>
+              <a:lumOff val="80000"/>
+            </a:schemeClr>
+          </a:solidFill>
+        </p:spPr>
+        <p:style>
+          <a:lnRef idx="2">
+            <a:schemeClr val="accent1">
+              <a:shade val="15000"/>
+            </a:schemeClr>
+          </a:lnRef>
+          <a:fillRef idx="1">
+            <a:schemeClr val="accent1"/>
+          </a:fillRef>
+          <a:effectRef idx="0">
+            <a:schemeClr val="accent1"/>
+          </a:effectRef>
+          <a:fontRef idx="minor">
+            <a:schemeClr val="lt1"/>
+          </a:fontRef>
+        </p:style>
+        <p:txBody>
+          <a:bodyPr rtlCol="0" anchor="ctr"/>
+          <a:lstStyle/>
+          <a:p>
+            <a:pPr algn="ctr"/>
+            <a:endParaRPr lang="en-IN"/>
+          </a:p>
+        </p:txBody>
+      </p:sp>
+      <p:sp>
+        <p:nvSpPr>
+          <p:cNvPr id="3" name="TextBox 2">
+            <a:extLst>
+              <a:ext uri="{FF2B5EF4-FFF2-40B4-BE49-F238E27FC236}">
+                <a16:creationId xmlns:a16="http://schemas.microsoft.com/office/drawing/2014/main" id="{3FAD271D-7F17-A07F-D892-7B9CD5F31192}"/>
+              </a:ext>
+            </a:extLst>
+          </p:cNvPr>
+          <p:cNvSpPr txBox="1"/>
+          <p:nvPr/>
+        </p:nvSpPr>
+        <p:spPr>
+          <a:xfrm>
+            <a:off x="1135010" y="3657185"/>
+            <a:ext cx="2542253" cy="276999"/>
+          </a:xfrm>
+          <a:prstGeom prst="rect">
+            <a:avLst/>
+          </a:prstGeom>
+          <a:noFill/>
+        </p:spPr>
+        <p:txBody>
+          <a:bodyPr wrap="square" rtlCol="0">
+            <a:spAutoFit/>
+          </a:bodyPr>
+          <a:lstStyle/>
+          <a:p>
+            <a:r>
+              <a:rPr lang="en-IN" sz="1200" dirty="0"/>
+              <a:t>Active Donation Requests</a:t>
+            </a:r>
+          </a:p>
+        </p:txBody>
+      </p:sp>
+      <p:sp>
+        <p:nvSpPr>
+          <p:cNvPr id="6" name="TextBox 5">
+            <a:extLst>
+              <a:ext uri="{FF2B5EF4-FFF2-40B4-BE49-F238E27FC236}">
+                <a16:creationId xmlns:a16="http://schemas.microsoft.com/office/drawing/2014/main" id="{7FA359BE-8DDF-459D-9211-A6085B5693FC}"/>
+              </a:ext>
+            </a:extLst>
+          </p:cNvPr>
+          <p:cNvSpPr txBox="1"/>
+          <p:nvPr/>
+        </p:nvSpPr>
+        <p:spPr>
+          <a:xfrm>
+            <a:off x="1165430" y="4095041"/>
+            <a:ext cx="1616792" cy="707886"/>
+          </a:xfrm>
+          <a:prstGeom prst="rect">
+            <a:avLst/>
+          </a:prstGeom>
+          <a:noFill/>
+        </p:spPr>
+        <p:txBody>
+          <a:bodyPr wrap="square" rtlCol="0">
+            <a:spAutoFit/>
+          </a:bodyPr>
+          <a:lstStyle/>
+          <a:p>
+            <a:r>
+              <a:rPr lang="en-IN" sz="1100" dirty="0"/>
+              <a:t>Date: Hospital Name</a:t>
+            </a:r>
+          </a:p>
+          <a:p>
+            <a:r>
+              <a:rPr lang="en-IN" sz="1100" dirty="0"/>
+              <a:t>Date: Hospital Name </a:t>
+            </a:r>
+          </a:p>
+          <a:p>
+            <a:r>
+              <a:rPr lang="en-IN" dirty="0"/>
+              <a:t> </a:t>
+            </a:r>
           </a:p>
         </p:txBody>
       </p:sp>
@@ -9526,6 +9665,119 @@
             <a:avLst>
               <a:gd name="adj1" fmla="val 28402"/>
             </a:avLst>
+          </a:prstGeom>
+          <a:ln>
+            <a:tailEnd type="triangle"/>
+          </a:ln>
+        </p:spPr>
+        <p:style>
+          <a:lnRef idx="1">
+            <a:schemeClr val="accent1"/>
+          </a:lnRef>
+          <a:fillRef idx="0">
+            <a:schemeClr val="accent1"/>
+          </a:fillRef>
+          <a:effectRef idx="0">
+            <a:schemeClr val="accent1"/>
+          </a:effectRef>
+          <a:fontRef idx="minor">
+            <a:schemeClr val="tx1"/>
+          </a:fontRef>
+        </p:style>
+      </p:cxnSp>
+      <p:pic>
+        <p:nvPicPr>
+          <p:cNvPr id="3" name="Picture 2">
+            <a:extLst>
+              <a:ext uri="{FF2B5EF4-FFF2-40B4-BE49-F238E27FC236}">
+                <a16:creationId xmlns:a16="http://schemas.microsoft.com/office/drawing/2014/main" id="{09E9C861-0D9F-6FDE-79DE-A27A8D8EBF9C}"/>
+              </a:ext>
+            </a:extLst>
+          </p:cNvPr>
+          <p:cNvPicPr>
+            <a:picLocks noChangeAspect="1"/>
+          </p:cNvPicPr>
+          <p:nvPr/>
+        </p:nvPicPr>
+        <p:blipFill>
+          <a:blip r:embed="rId2">
+            <a:extLst>
+              <a:ext uri="{28A0092B-C50C-407E-A947-70E740481C1C}">
+                <a14:useLocalDpi xmlns:a14="http://schemas.microsoft.com/office/drawing/2010/main" val="0"/>
+              </a:ext>
+            </a:extLst>
+          </a:blip>
+          <a:stretch>
+            <a:fillRect/>
+          </a:stretch>
+        </p:blipFill>
+        <p:spPr>
+          <a:xfrm>
+            <a:off x="4532671" y="1343480"/>
+            <a:ext cx="334298" cy="334298"/>
+          </a:xfrm>
+          <a:prstGeom prst="rect">
+            <a:avLst/>
+          </a:prstGeom>
+        </p:spPr>
+      </p:pic>
+      <p:sp>
+        <p:nvSpPr>
+          <p:cNvPr id="22" name="TextBox 21">
+            <a:extLst>
+              <a:ext uri="{FF2B5EF4-FFF2-40B4-BE49-F238E27FC236}">
+                <a16:creationId xmlns:a16="http://schemas.microsoft.com/office/drawing/2014/main" id="{F701206A-A684-4DC6-4817-C72422485389}"/>
+              </a:ext>
+            </a:extLst>
+          </p:cNvPr>
+          <p:cNvSpPr txBox="1"/>
+          <p:nvPr/>
+        </p:nvSpPr>
+        <p:spPr>
+          <a:xfrm>
+            <a:off x="6449960" y="290114"/>
+            <a:ext cx="3372465" cy="600164"/>
+          </a:xfrm>
+          <a:prstGeom prst="rect">
+            <a:avLst/>
+          </a:prstGeom>
+          <a:noFill/>
+        </p:spPr>
+        <p:txBody>
+          <a:bodyPr wrap="square" rtlCol="0">
+            <a:spAutoFit/>
+          </a:bodyPr>
+          <a:lstStyle/>
+          <a:p>
+            <a:r>
+              <a:rPr lang="en-IN" sz="1100" dirty="0"/>
+              <a:t>The filter option allows the hospitals to filter donors based on distance and blood groups and request blood donations in bulk</a:t>
+            </a:r>
+          </a:p>
+        </p:txBody>
+      </p:sp>
+      <p:cxnSp>
+        <p:nvCxnSpPr>
+          <p:cNvPr id="26" name="Connector: Elbow 25">
+            <a:extLst>
+              <a:ext uri="{FF2B5EF4-FFF2-40B4-BE49-F238E27FC236}">
+                <a16:creationId xmlns:a16="http://schemas.microsoft.com/office/drawing/2014/main" id="{0FE94889-71AB-170B-5FF5-2A51C1879659}"/>
+              </a:ext>
+            </a:extLst>
+          </p:cNvPr>
+          <p:cNvCxnSpPr>
+            <a:stCxn id="3" idx="0"/>
+            <a:endCxn id="22" idx="1"/>
+          </p:cNvCxnSpPr>
+          <p:nvPr/>
+        </p:nvCxnSpPr>
+        <p:spPr>
+          <a:xfrm rot="5400000" flipH="1" flipV="1">
+            <a:off x="5198248" y="91768"/>
+            <a:ext cx="753284" cy="1750140"/>
+          </a:xfrm>
+          <a:prstGeom prst="bentConnector2">
+            <a:avLst/>
           </a:prstGeom>
           <a:ln>
             <a:tailEnd type="triangle"/>

</xml_diff>